<commit_message>
Updated files (add "with" syntax for file opening)
</commit_message>
<xml_diff>
--- a/week04-ch8-14-pys.pptx
+++ b/week04-ch8-14-pys.pptx
@@ -20,8 +20,9 @@
     <p:sldId id="271" r:id="rId14"/>
     <p:sldId id="262" r:id="rId15"/>
     <p:sldId id="272" r:id="rId16"/>
-    <p:sldId id="273" r:id="rId17"/>
-    <p:sldId id="263" r:id="rId18"/>
+    <p:sldId id="274" r:id="rId17"/>
+    <p:sldId id="273" r:id="rId18"/>
+    <p:sldId id="263" r:id="rId19"/>
   </p:sldIdLst>
   <p:sldSz cx="12192000" cy="6858000"/>
   <p:notesSz cx="6858000" cy="9144000"/>
@@ -4895,7 +4896,7 @@
           <a:p>
             <a:r>
               <a:rPr lang="en-US" dirty="0" smtClean="0"/>
-              <a:t>Files and using pipes example</a:t>
+              <a:t>Read files using “with”</a:t>
             </a:r>
             <a:endParaRPr lang="en-US" dirty="0"/>
           </a:p>
@@ -4919,214 +4920,510 @@
           <a:lstStyle/>
           <a:p>
             <a:r>
-              <a:rPr lang="en-US" dirty="0"/>
-              <a:t>You can use a pipe to run md5sum from Python and get the result:</a:t>
-            </a:r>
-          </a:p>
-          <a:p>
-            <a:pPr marL="457200" lvl="1" indent="0">
-              <a:buNone/>
-            </a:pPr>
-            <a:r>
-              <a:rPr lang="en-US" sz="1800" dirty="0">
-                <a:latin typeface="Times New Roman" panose="02020603050405020304" pitchFamily="18" charset="0"/>
-                <a:cs typeface="Times New Roman" panose="02020603050405020304" pitchFamily="18" charset="0"/>
-              </a:rPr>
-              <a:t>&gt;&gt;&gt; filename = '</a:t>
-            </a:r>
-            <a:r>
-              <a:rPr lang="en-US" sz="1800" dirty="0" err="1">
-                <a:latin typeface="Times New Roman" panose="02020603050405020304" pitchFamily="18" charset="0"/>
-                <a:cs typeface="Times New Roman" panose="02020603050405020304" pitchFamily="18" charset="0"/>
-              </a:rPr>
-              <a:t>book.tex</a:t>
-            </a:r>
-            <a:r>
-              <a:rPr lang="en-US" sz="1800" dirty="0">
-                <a:latin typeface="Times New Roman" panose="02020603050405020304" pitchFamily="18" charset="0"/>
-                <a:cs typeface="Times New Roman" panose="02020603050405020304" pitchFamily="18" charset="0"/>
-              </a:rPr>
-              <a:t>'</a:t>
-            </a:r>
-          </a:p>
-          <a:p>
-            <a:pPr marL="457200" lvl="1" indent="0">
-              <a:buNone/>
-            </a:pPr>
-            <a:r>
-              <a:rPr lang="en-US" sz="1800" dirty="0">
+              <a:rPr lang="en-US" dirty="0" smtClean="0"/>
+              <a:t>The “with” method allows us to “auto-close” the file handle when we’re done:</a:t>
+            </a:r>
+          </a:p>
+          <a:p>
+            <a:pPr marL="914400" lvl="2" indent="0">
+              <a:buNone/>
+            </a:pPr>
+            <a:r>
+              <a:rPr lang="en-US" sz="1600" dirty="0" smtClean="0">
+                <a:latin typeface="Times New Roman" panose="02020603050405020304" pitchFamily="18" charset="0"/>
+                <a:cs typeface="Times New Roman" panose="02020603050405020304" pitchFamily="18" charset="0"/>
+              </a:rPr>
+              <a:t>&gt;&gt;&gt; with open('./00_cmdfile.txt', 'r') as fin:</a:t>
+            </a:r>
+          </a:p>
+          <a:p>
+            <a:pPr marL="914400" lvl="2" indent="0">
+              <a:buNone/>
+            </a:pPr>
+            <a:r>
+              <a:rPr lang="en-US" sz="1600" dirty="0" smtClean="0">
+                <a:latin typeface="Times New Roman" panose="02020603050405020304" pitchFamily="18" charset="0"/>
+                <a:cs typeface="Times New Roman" panose="02020603050405020304" pitchFamily="18" charset="0"/>
+              </a:rPr>
+              <a:t>...     </a:t>
+            </a:r>
+            <a:r>
+              <a:rPr lang="en-US" sz="1600" dirty="0" err="1" smtClean="0">
+                <a:latin typeface="Times New Roman" panose="02020603050405020304" pitchFamily="18" charset="0"/>
+                <a:cs typeface="Times New Roman" panose="02020603050405020304" pitchFamily="18" charset="0"/>
+              </a:rPr>
+              <a:t>read_data</a:t>
+            </a:r>
+            <a:r>
+              <a:rPr lang="en-US" sz="1600" dirty="0" smtClean="0">
+                <a:latin typeface="Times New Roman" panose="02020603050405020304" pitchFamily="18" charset="0"/>
+                <a:cs typeface="Times New Roman" panose="02020603050405020304" pitchFamily="18" charset="0"/>
+              </a:rPr>
+              <a:t> = </a:t>
+            </a:r>
+            <a:r>
+              <a:rPr lang="en-US" sz="1600" dirty="0" err="1" smtClean="0">
+                <a:latin typeface="Times New Roman" panose="02020603050405020304" pitchFamily="18" charset="0"/>
+                <a:cs typeface="Times New Roman" panose="02020603050405020304" pitchFamily="18" charset="0"/>
+              </a:rPr>
+              <a:t>fin.read</a:t>
+            </a:r>
+            <a:r>
+              <a:rPr lang="en-US" sz="1600" dirty="0" smtClean="0">
+                <a:latin typeface="Times New Roman" panose="02020603050405020304" pitchFamily="18" charset="0"/>
+                <a:cs typeface="Times New Roman" panose="02020603050405020304" pitchFamily="18" charset="0"/>
+              </a:rPr>
+              <a:t>()</a:t>
+            </a:r>
+          </a:p>
+          <a:p>
+            <a:pPr marL="914400" lvl="2" indent="0">
+              <a:buNone/>
+            </a:pPr>
+            <a:r>
+              <a:rPr lang="en-US" sz="1600" dirty="0" smtClean="0">
                 <a:latin typeface="Times New Roman" panose="02020603050405020304" pitchFamily="18" charset="0"/>
                 <a:cs typeface="Times New Roman" panose="02020603050405020304" pitchFamily="18" charset="0"/>
               </a:rPr>
               <a:t>&gt;&gt;&gt; </a:t>
             </a:r>
             <a:r>
-              <a:rPr lang="en-US" sz="1800" dirty="0" err="1">
-                <a:latin typeface="Times New Roman" panose="02020603050405020304" pitchFamily="18" charset="0"/>
-                <a:cs typeface="Times New Roman" panose="02020603050405020304" pitchFamily="18" charset="0"/>
-              </a:rPr>
-              <a:t>cmd</a:t>
-            </a:r>
-            <a:r>
-              <a:rPr lang="en-US" sz="1800" dirty="0">
-                <a:latin typeface="Times New Roman" panose="02020603050405020304" pitchFamily="18" charset="0"/>
-                <a:cs typeface="Times New Roman" panose="02020603050405020304" pitchFamily="18" charset="0"/>
-              </a:rPr>
-              <a:t> = 'md5sum ' + filename</a:t>
-            </a:r>
-          </a:p>
-          <a:p>
-            <a:pPr marL="457200" lvl="1" indent="0">
-              <a:buNone/>
-            </a:pPr>
-            <a:r>
-              <a:rPr lang="en-US" sz="1800" dirty="0">
-                <a:latin typeface="Times New Roman" panose="02020603050405020304" pitchFamily="18" charset="0"/>
-                <a:cs typeface="Times New Roman" panose="02020603050405020304" pitchFamily="18" charset="0"/>
-              </a:rPr>
-              <a:t>&gt;&gt;&gt; </a:t>
-            </a:r>
-            <a:r>
-              <a:rPr lang="en-US" sz="1800" dirty="0" err="1">
-                <a:latin typeface="Times New Roman" panose="02020603050405020304" pitchFamily="18" charset="0"/>
-                <a:cs typeface="Times New Roman" panose="02020603050405020304" pitchFamily="18" charset="0"/>
-              </a:rPr>
-              <a:t>fp</a:t>
-            </a:r>
-            <a:r>
-              <a:rPr lang="en-US" sz="1800" dirty="0">
-                <a:latin typeface="Times New Roman" panose="02020603050405020304" pitchFamily="18" charset="0"/>
-                <a:cs typeface="Times New Roman" panose="02020603050405020304" pitchFamily="18" charset="0"/>
-              </a:rPr>
-              <a:t> = </a:t>
-            </a:r>
-            <a:r>
-              <a:rPr lang="en-US" sz="1800" dirty="0" err="1">
-                <a:latin typeface="Times New Roman" panose="02020603050405020304" pitchFamily="18" charset="0"/>
-                <a:cs typeface="Times New Roman" panose="02020603050405020304" pitchFamily="18" charset="0"/>
-              </a:rPr>
-              <a:t>os.popen</a:t>
-            </a:r>
-            <a:r>
-              <a:rPr lang="en-US" sz="1800" dirty="0">
-                <a:latin typeface="Times New Roman" panose="02020603050405020304" pitchFamily="18" charset="0"/>
-                <a:cs typeface="Times New Roman" panose="02020603050405020304" pitchFamily="18" charset="0"/>
-              </a:rPr>
-              <a:t>(</a:t>
-            </a:r>
-            <a:r>
-              <a:rPr lang="en-US" sz="1800" dirty="0" err="1">
-                <a:latin typeface="Times New Roman" panose="02020603050405020304" pitchFamily="18" charset="0"/>
-                <a:cs typeface="Times New Roman" panose="02020603050405020304" pitchFamily="18" charset="0"/>
-              </a:rPr>
-              <a:t>cmd</a:t>
-            </a:r>
-            <a:r>
-              <a:rPr lang="en-US" sz="1800" dirty="0">
-                <a:latin typeface="Times New Roman" panose="02020603050405020304" pitchFamily="18" charset="0"/>
-                <a:cs typeface="Times New Roman" panose="02020603050405020304" pitchFamily="18" charset="0"/>
-              </a:rPr>
-              <a:t>)</a:t>
-            </a:r>
-          </a:p>
-          <a:p>
-            <a:pPr marL="457200" lvl="1" indent="0">
-              <a:buNone/>
-            </a:pPr>
-            <a:r>
-              <a:rPr lang="en-US" sz="1800" dirty="0">
-                <a:latin typeface="Times New Roman" panose="02020603050405020304" pitchFamily="18" charset="0"/>
-                <a:cs typeface="Times New Roman" panose="02020603050405020304" pitchFamily="18" charset="0"/>
-              </a:rPr>
-              <a:t>&gt;&gt;&gt; res = </a:t>
-            </a:r>
-            <a:r>
-              <a:rPr lang="en-US" sz="1800" dirty="0" err="1">
-                <a:latin typeface="Times New Roman" panose="02020603050405020304" pitchFamily="18" charset="0"/>
-                <a:cs typeface="Times New Roman" panose="02020603050405020304" pitchFamily="18" charset="0"/>
-              </a:rPr>
-              <a:t>fp.read</a:t>
-            </a:r>
-            <a:r>
-              <a:rPr lang="en-US" sz="1800" dirty="0">
-                <a:latin typeface="Times New Roman" panose="02020603050405020304" pitchFamily="18" charset="0"/>
-                <a:cs typeface="Times New Roman" panose="02020603050405020304" pitchFamily="18" charset="0"/>
-              </a:rPr>
-              <a:t>()</a:t>
-            </a:r>
-          </a:p>
-          <a:p>
-            <a:pPr marL="457200" lvl="1" indent="0">
-              <a:buNone/>
-            </a:pPr>
-            <a:r>
-              <a:rPr lang="en-US" sz="1800" dirty="0">
-                <a:latin typeface="Times New Roman" panose="02020603050405020304" pitchFamily="18" charset="0"/>
-                <a:cs typeface="Times New Roman" panose="02020603050405020304" pitchFamily="18" charset="0"/>
-              </a:rPr>
-              <a:t>&gt;&gt;&gt; stat = </a:t>
-            </a:r>
-            <a:r>
-              <a:rPr lang="en-US" sz="1800" dirty="0" err="1">
-                <a:latin typeface="Times New Roman" panose="02020603050405020304" pitchFamily="18" charset="0"/>
-                <a:cs typeface="Times New Roman" panose="02020603050405020304" pitchFamily="18" charset="0"/>
-              </a:rPr>
-              <a:t>fp.close</a:t>
-            </a:r>
-            <a:r>
-              <a:rPr lang="en-US" sz="1800" dirty="0">
-                <a:latin typeface="Times New Roman" panose="02020603050405020304" pitchFamily="18" charset="0"/>
-                <a:cs typeface="Times New Roman" panose="02020603050405020304" pitchFamily="18" charset="0"/>
-              </a:rPr>
-              <a:t>()</a:t>
-            </a:r>
-          </a:p>
-          <a:p>
-            <a:pPr marL="457200" lvl="1" indent="0">
-              <a:buNone/>
-            </a:pPr>
-            <a:r>
-              <a:rPr lang="en-US" sz="1800" dirty="0">
-                <a:latin typeface="Times New Roman" panose="02020603050405020304" pitchFamily="18" charset="0"/>
-                <a:cs typeface="Times New Roman" panose="02020603050405020304" pitchFamily="18" charset="0"/>
-              </a:rPr>
-              <a:t>&gt;&gt;&gt; print res</a:t>
-            </a:r>
-          </a:p>
-          <a:p>
-            <a:pPr marL="457200" lvl="1" indent="0">
-              <a:buNone/>
-            </a:pPr>
-            <a:r>
-              <a:rPr lang="en-US" sz="1800" dirty="0">
-                <a:latin typeface="Times New Roman" panose="02020603050405020304" pitchFamily="18" charset="0"/>
-                <a:cs typeface="Times New Roman" panose="02020603050405020304" pitchFamily="18" charset="0"/>
-              </a:rPr>
-              <a:t>1e0033f0ed0656636de0d75144ba32e0 </a:t>
-            </a:r>
-            <a:r>
-              <a:rPr lang="en-US" sz="1800" dirty="0" err="1">
-                <a:latin typeface="Times New Roman" panose="02020603050405020304" pitchFamily="18" charset="0"/>
-                <a:cs typeface="Times New Roman" panose="02020603050405020304" pitchFamily="18" charset="0"/>
-              </a:rPr>
-              <a:t>book.tex</a:t>
-            </a:r>
-            <a:endParaRPr lang="en-US" sz="1800" dirty="0">
+              <a:rPr lang="en-US" sz="1600" dirty="0" err="1" smtClean="0">
+                <a:latin typeface="Times New Roman" panose="02020603050405020304" pitchFamily="18" charset="0"/>
+                <a:cs typeface="Times New Roman" panose="02020603050405020304" pitchFamily="18" charset="0"/>
+              </a:rPr>
+              <a:t>fin.closed</a:t>
+            </a:r>
+            <a:endParaRPr lang="en-US" sz="1600" dirty="0" smtClean="0">
               <a:latin typeface="Times New Roman" panose="02020603050405020304" pitchFamily="18" charset="0"/>
               <a:cs typeface="Times New Roman" panose="02020603050405020304" pitchFamily="18" charset="0"/>
             </a:endParaRPr>
           </a:p>
           <a:p>
-            <a:pPr marL="457200" lvl="1" indent="0">
-              <a:buNone/>
-            </a:pPr>
-            <a:r>
-              <a:rPr lang="en-US" sz="1800" dirty="0">
-                <a:latin typeface="Times New Roman" panose="02020603050405020304" pitchFamily="18" charset="0"/>
-                <a:cs typeface="Times New Roman" panose="02020603050405020304" pitchFamily="18" charset="0"/>
-              </a:rPr>
-              <a:t>&gt;&gt;&gt; print stat</a:t>
-            </a:r>
+            <a:pPr marL="914400" lvl="2" indent="0">
+              <a:buNone/>
+            </a:pPr>
+            <a:r>
+              <a:rPr lang="en-US" sz="1600" dirty="0" smtClean="0">
+                <a:latin typeface="Times New Roman" panose="02020603050405020304" pitchFamily="18" charset="0"/>
+                <a:cs typeface="Times New Roman" panose="02020603050405020304" pitchFamily="18" charset="0"/>
+              </a:rPr>
+              <a:t>True</a:t>
+            </a:r>
+          </a:p>
+          <a:p>
+            <a:pPr marL="914400" lvl="2" indent="0">
+              <a:buNone/>
+            </a:pPr>
+            <a:r>
+              <a:rPr lang="en-US" sz="1600" dirty="0" smtClean="0">
+                <a:latin typeface="Times New Roman" panose="02020603050405020304" pitchFamily="18" charset="0"/>
+                <a:cs typeface="Times New Roman" panose="02020603050405020304" pitchFamily="18" charset="0"/>
+              </a:rPr>
+              <a:t>&gt;&gt;&gt; print </a:t>
+            </a:r>
+            <a:r>
+              <a:rPr lang="en-US" sz="1600" dirty="0" err="1" smtClean="0">
+                <a:latin typeface="Times New Roman" panose="02020603050405020304" pitchFamily="18" charset="0"/>
+                <a:cs typeface="Times New Roman" panose="02020603050405020304" pitchFamily="18" charset="0"/>
+              </a:rPr>
+              <a:t>read_data</a:t>
+            </a:r>
+            <a:endParaRPr lang="en-US" sz="1600" dirty="0" smtClean="0">
+              <a:latin typeface="Times New Roman" panose="02020603050405020304" pitchFamily="18" charset="0"/>
+              <a:cs typeface="Times New Roman" panose="02020603050405020304" pitchFamily="18" charset="0"/>
+            </a:endParaRPr>
+          </a:p>
+          <a:p>
+            <a:pPr marL="914400" lvl="2" indent="0">
+              <a:buNone/>
+            </a:pPr>
+            <a:r>
+              <a:rPr lang="en-US" sz="1600" dirty="0" smtClean="0">
+                <a:latin typeface="Times New Roman" panose="02020603050405020304" pitchFamily="18" charset="0"/>
+                <a:cs typeface="Times New Roman" panose="02020603050405020304" pitchFamily="18" charset="0"/>
+              </a:rPr>
+              <a:t>term length 0</a:t>
+            </a:r>
+          </a:p>
+          <a:p>
+            <a:pPr marL="914400" lvl="2" indent="0">
+              <a:buNone/>
+            </a:pPr>
+            <a:r>
+              <a:rPr lang="en-US" sz="1600" dirty="0" smtClean="0">
+                <a:latin typeface="Times New Roman" panose="02020603050405020304" pitchFamily="18" charset="0"/>
+                <a:cs typeface="Times New Roman" panose="02020603050405020304" pitchFamily="18" charset="0"/>
+              </a:rPr>
+              <a:t>show version</a:t>
+            </a:r>
+          </a:p>
+          <a:p>
+            <a:pPr marL="914400" lvl="2" indent="0">
+              <a:buNone/>
+            </a:pPr>
+            <a:r>
+              <a:rPr lang="en-US" sz="1600" dirty="0" smtClean="0">
+                <a:latin typeface="Times New Roman" panose="02020603050405020304" pitchFamily="18" charset="0"/>
+                <a:cs typeface="Times New Roman" panose="02020603050405020304" pitchFamily="18" charset="0"/>
+              </a:rPr>
+              <a:t>show license host-id</a:t>
+            </a:r>
+          </a:p>
+          <a:p>
+            <a:pPr marL="914400" lvl="2" indent="0">
+              <a:buNone/>
+            </a:pPr>
+            <a:endParaRPr lang="en-US" dirty="0">
+              <a:latin typeface="Times New Roman" panose="02020603050405020304" pitchFamily="18" charset="0"/>
+              <a:cs typeface="Times New Roman" panose="02020603050405020304" pitchFamily="18" charset="0"/>
+            </a:endParaRPr>
+          </a:p>
+        </p:txBody>
+      </p:sp>
+    </p:spTree>
+    <p:extLst>
+      <p:ext uri="{BB962C8B-B14F-4D97-AF65-F5344CB8AC3E}">
+        <p14:creationId xmlns:p14="http://schemas.microsoft.com/office/powerpoint/2010/main" val="449655514"/>
+      </p:ext>
+    </p:extLst>
+  </p:cSld>
+  <p:clrMapOvr>
+    <a:masterClrMapping/>
+  </p:clrMapOvr>
+</p:sld>
+</file>
+
+<file path=ppt/slides/slide17.xml><?xml version="1.0" encoding="utf-8"?>
+<p:sld xmlns:a="http://schemas.openxmlformats.org/drawingml/2006/main" xmlns:r="http://schemas.openxmlformats.org/officeDocument/2006/relationships" xmlns:p="http://schemas.openxmlformats.org/presentationml/2006/main">
+  <p:cSld>
+    <p:spTree>
+      <p:nvGrpSpPr>
+        <p:cNvPr id="1" name=""/>
+        <p:cNvGrpSpPr/>
+        <p:nvPr/>
+      </p:nvGrpSpPr>
+      <p:grpSpPr>
+        <a:xfrm>
+          <a:off x="0" y="0"/>
+          <a:ext cx="0" cy="0"/>
+          <a:chOff x="0" y="0"/>
+          <a:chExt cx="0" cy="0"/>
+        </a:xfrm>
+      </p:grpSpPr>
+      <p:sp>
+        <p:nvSpPr>
+          <p:cNvPr id="2" name="Title 1"/>
+          <p:cNvSpPr>
+            <a:spLocks noGrp="1"/>
+          </p:cNvSpPr>
+          <p:nvPr>
+            <p:ph type="title"/>
+          </p:nvPr>
+        </p:nvSpPr>
+        <p:spPr/>
+        <p:txBody>
+          <a:bodyPr/>
+          <a:lstStyle/>
+          <a:p>
+            <a:r>
+              <a:rPr lang="en-US" dirty="0" smtClean="0"/>
+              <a:t>Files and using pipes example</a:t>
+            </a:r>
+            <a:endParaRPr lang="en-US" dirty="0"/>
+          </a:p>
+        </p:txBody>
+      </p:sp>
+      <p:sp>
+        <p:nvSpPr>
+          <p:cNvPr id="3" name="Content Placeholder 2"/>
+          <p:cNvSpPr>
+            <a:spLocks noGrp="1"/>
+          </p:cNvSpPr>
+          <p:nvPr>
+            <p:ph idx="1"/>
+          </p:nvPr>
+        </p:nvSpPr>
+        <p:spPr/>
+        <p:txBody>
+          <a:bodyPr>
+            <a:normAutofit/>
+          </a:bodyPr>
+          <a:lstStyle/>
+          <a:p>
+            <a:r>
+              <a:rPr lang="en-US" dirty="0"/>
+              <a:t>You can use a pipe to run md5sum from Python and get the result:</a:t>
+            </a:r>
+          </a:p>
+          <a:p>
+            <a:pPr marL="914400" lvl="2" indent="0">
+              <a:buNone/>
+            </a:pPr>
+            <a:r>
+              <a:rPr lang="en-US" sz="1400" dirty="0">
+                <a:latin typeface="Times New Roman" panose="02020603050405020304" pitchFamily="18" charset="0"/>
+                <a:cs typeface="Times New Roman" panose="02020603050405020304" pitchFamily="18" charset="0"/>
+              </a:rPr>
+              <a:t>&gt;&gt;&gt; filename = '</a:t>
+            </a:r>
+            <a:r>
+              <a:rPr lang="en-US" sz="1400" dirty="0" err="1">
+                <a:latin typeface="Times New Roman" panose="02020603050405020304" pitchFamily="18" charset="0"/>
+                <a:cs typeface="Times New Roman" panose="02020603050405020304" pitchFamily="18" charset="0"/>
+              </a:rPr>
+              <a:t>book.tex</a:t>
+            </a:r>
+            <a:r>
+              <a:rPr lang="en-US" sz="1400" dirty="0">
+                <a:latin typeface="Times New Roman" panose="02020603050405020304" pitchFamily="18" charset="0"/>
+                <a:cs typeface="Times New Roman" panose="02020603050405020304" pitchFamily="18" charset="0"/>
+              </a:rPr>
+              <a:t>'</a:t>
+            </a:r>
+          </a:p>
+          <a:p>
+            <a:pPr marL="914400" lvl="2" indent="0">
+              <a:buNone/>
+            </a:pPr>
+            <a:r>
+              <a:rPr lang="en-US" sz="1400" dirty="0">
+                <a:latin typeface="Times New Roman" panose="02020603050405020304" pitchFamily="18" charset="0"/>
+                <a:cs typeface="Times New Roman" panose="02020603050405020304" pitchFamily="18" charset="0"/>
+              </a:rPr>
+              <a:t>&gt;&gt;&gt; </a:t>
+            </a:r>
+            <a:r>
+              <a:rPr lang="en-US" sz="1400" dirty="0" err="1">
+                <a:latin typeface="Times New Roman" panose="02020603050405020304" pitchFamily="18" charset="0"/>
+                <a:cs typeface="Times New Roman" panose="02020603050405020304" pitchFamily="18" charset="0"/>
+              </a:rPr>
+              <a:t>cmd</a:t>
+            </a:r>
+            <a:r>
+              <a:rPr lang="en-US" sz="1400" dirty="0">
+                <a:latin typeface="Times New Roman" panose="02020603050405020304" pitchFamily="18" charset="0"/>
+                <a:cs typeface="Times New Roman" panose="02020603050405020304" pitchFamily="18" charset="0"/>
+              </a:rPr>
+              <a:t> = 'md5sum ' + filename</a:t>
+            </a:r>
+          </a:p>
+          <a:p>
+            <a:pPr marL="914400" lvl="2" indent="0">
+              <a:buNone/>
+            </a:pPr>
+            <a:r>
+              <a:rPr lang="en-US" sz="1400" dirty="0">
+                <a:latin typeface="Times New Roman" panose="02020603050405020304" pitchFamily="18" charset="0"/>
+                <a:cs typeface="Times New Roman" panose="02020603050405020304" pitchFamily="18" charset="0"/>
+              </a:rPr>
+              <a:t>&gt;&gt;&gt; </a:t>
+            </a:r>
+            <a:r>
+              <a:rPr lang="en-US" sz="1400" dirty="0" err="1">
+                <a:latin typeface="Times New Roman" panose="02020603050405020304" pitchFamily="18" charset="0"/>
+                <a:cs typeface="Times New Roman" panose="02020603050405020304" pitchFamily="18" charset="0"/>
+              </a:rPr>
+              <a:t>fp</a:t>
+            </a:r>
+            <a:r>
+              <a:rPr lang="en-US" sz="1400" dirty="0">
+                <a:latin typeface="Times New Roman" panose="02020603050405020304" pitchFamily="18" charset="0"/>
+                <a:cs typeface="Times New Roman" panose="02020603050405020304" pitchFamily="18" charset="0"/>
+              </a:rPr>
+              <a:t> = </a:t>
+            </a:r>
+            <a:r>
+              <a:rPr lang="en-US" sz="1400" dirty="0" err="1">
+                <a:latin typeface="Times New Roman" panose="02020603050405020304" pitchFamily="18" charset="0"/>
+                <a:cs typeface="Times New Roman" panose="02020603050405020304" pitchFamily="18" charset="0"/>
+              </a:rPr>
+              <a:t>os.popen</a:t>
+            </a:r>
+            <a:r>
+              <a:rPr lang="en-US" sz="1400" dirty="0">
+                <a:latin typeface="Times New Roman" panose="02020603050405020304" pitchFamily="18" charset="0"/>
+                <a:cs typeface="Times New Roman" panose="02020603050405020304" pitchFamily="18" charset="0"/>
+              </a:rPr>
+              <a:t>(</a:t>
+            </a:r>
+            <a:r>
+              <a:rPr lang="en-US" sz="1400" dirty="0" err="1">
+                <a:latin typeface="Times New Roman" panose="02020603050405020304" pitchFamily="18" charset="0"/>
+                <a:cs typeface="Times New Roman" panose="02020603050405020304" pitchFamily="18" charset="0"/>
+              </a:rPr>
+              <a:t>cmd</a:t>
+            </a:r>
+            <a:r>
+              <a:rPr lang="en-US" sz="1400" dirty="0">
+                <a:latin typeface="Times New Roman" panose="02020603050405020304" pitchFamily="18" charset="0"/>
+                <a:cs typeface="Times New Roman" panose="02020603050405020304" pitchFamily="18" charset="0"/>
+              </a:rPr>
+              <a:t>)</a:t>
+            </a:r>
+          </a:p>
+          <a:p>
+            <a:pPr marL="914400" lvl="2" indent="0">
+              <a:buNone/>
+            </a:pPr>
+            <a:r>
+              <a:rPr lang="en-US" sz="1400" dirty="0">
+                <a:latin typeface="Times New Roman" panose="02020603050405020304" pitchFamily="18" charset="0"/>
+                <a:cs typeface="Times New Roman" panose="02020603050405020304" pitchFamily="18" charset="0"/>
+              </a:rPr>
+              <a:t>&gt;&gt;&gt; res = </a:t>
+            </a:r>
+            <a:r>
+              <a:rPr lang="en-US" sz="1400" dirty="0" err="1">
+                <a:latin typeface="Times New Roman" panose="02020603050405020304" pitchFamily="18" charset="0"/>
+                <a:cs typeface="Times New Roman" panose="02020603050405020304" pitchFamily="18" charset="0"/>
+              </a:rPr>
+              <a:t>fp.read</a:t>
+            </a:r>
+            <a:r>
+              <a:rPr lang="en-US" sz="1400" dirty="0">
+                <a:latin typeface="Times New Roman" panose="02020603050405020304" pitchFamily="18" charset="0"/>
+                <a:cs typeface="Times New Roman" panose="02020603050405020304" pitchFamily="18" charset="0"/>
+              </a:rPr>
+              <a:t>()</a:t>
+            </a:r>
+          </a:p>
+          <a:p>
+            <a:pPr marL="914400" lvl="2" indent="0">
+              <a:buNone/>
+            </a:pPr>
+            <a:r>
+              <a:rPr lang="en-US" sz="1400" dirty="0">
+                <a:latin typeface="Times New Roman" panose="02020603050405020304" pitchFamily="18" charset="0"/>
+                <a:cs typeface="Times New Roman" panose="02020603050405020304" pitchFamily="18" charset="0"/>
+              </a:rPr>
+              <a:t>&gt;&gt;&gt; stat = </a:t>
+            </a:r>
+            <a:r>
+              <a:rPr lang="en-US" sz="1400" dirty="0" err="1">
+                <a:latin typeface="Times New Roman" panose="02020603050405020304" pitchFamily="18" charset="0"/>
+                <a:cs typeface="Times New Roman" panose="02020603050405020304" pitchFamily="18" charset="0"/>
+              </a:rPr>
+              <a:t>fp.close</a:t>
+            </a:r>
+            <a:r>
+              <a:rPr lang="en-US" sz="1400" dirty="0">
+                <a:latin typeface="Times New Roman" panose="02020603050405020304" pitchFamily="18" charset="0"/>
+                <a:cs typeface="Times New Roman" panose="02020603050405020304" pitchFamily="18" charset="0"/>
+              </a:rPr>
+              <a:t>()</a:t>
+            </a:r>
+          </a:p>
+          <a:p>
+            <a:pPr marL="914400" lvl="2" indent="0">
+              <a:buNone/>
+            </a:pPr>
+            <a:r>
+              <a:rPr lang="en-US" sz="1400" dirty="0">
+                <a:latin typeface="Times New Roman" panose="02020603050405020304" pitchFamily="18" charset="0"/>
+                <a:cs typeface="Times New Roman" panose="02020603050405020304" pitchFamily="18" charset="0"/>
+              </a:rPr>
+              <a:t>&gt;&gt;&gt; print res</a:t>
+            </a:r>
+          </a:p>
+          <a:p>
+            <a:pPr marL="914400" lvl="2" indent="0">
+              <a:buNone/>
+            </a:pPr>
+            <a:r>
+              <a:rPr lang="en-US" sz="1400" dirty="0">
+                <a:latin typeface="Times New Roman" panose="02020603050405020304" pitchFamily="18" charset="0"/>
+                <a:cs typeface="Times New Roman" panose="02020603050405020304" pitchFamily="18" charset="0"/>
+              </a:rPr>
+              <a:t>1e0033f0ed0656636de0d75144ba32e0 </a:t>
+            </a:r>
+            <a:r>
+              <a:rPr lang="en-US" sz="1400" dirty="0" err="1">
+                <a:latin typeface="Times New Roman" panose="02020603050405020304" pitchFamily="18" charset="0"/>
+                <a:cs typeface="Times New Roman" panose="02020603050405020304" pitchFamily="18" charset="0"/>
+              </a:rPr>
+              <a:t>book.tex</a:t>
+            </a:r>
+            <a:endParaRPr lang="en-US" sz="1400" dirty="0">
+              <a:latin typeface="Times New Roman" panose="02020603050405020304" pitchFamily="18" charset="0"/>
+              <a:cs typeface="Times New Roman" panose="02020603050405020304" pitchFamily="18" charset="0"/>
+            </a:endParaRPr>
+          </a:p>
+          <a:p>
+            <a:pPr marL="914400" lvl="2" indent="0">
+              <a:buNone/>
+            </a:pPr>
+            <a:r>
+              <a:rPr lang="en-US" sz="1400" dirty="0">
+                <a:latin typeface="Times New Roman" panose="02020603050405020304" pitchFamily="18" charset="0"/>
+                <a:cs typeface="Times New Roman" panose="02020603050405020304" pitchFamily="18" charset="0"/>
+              </a:rPr>
+              <a:t>&gt;&gt;&gt; print </a:t>
+            </a:r>
+            <a:r>
+              <a:rPr lang="en-US" sz="1400" dirty="0" smtClean="0">
+                <a:latin typeface="Times New Roman" panose="02020603050405020304" pitchFamily="18" charset="0"/>
+                <a:cs typeface="Times New Roman" panose="02020603050405020304" pitchFamily="18" charset="0"/>
+              </a:rPr>
+              <a:t>stat</a:t>
+            </a:r>
+          </a:p>
+          <a:p>
+            <a:endParaRPr lang="en-US" sz="800" dirty="0" smtClean="0">
+              <a:latin typeface="Times New Roman" panose="02020603050405020304" pitchFamily="18" charset="0"/>
+              <a:cs typeface="Times New Roman" panose="02020603050405020304" pitchFamily="18" charset="0"/>
+            </a:endParaRPr>
+          </a:p>
+          <a:p>
+            <a:endParaRPr lang="en-US" sz="800" dirty="0">
+              <a:latin typeface="Times New Roman" panose="02020603050405020304" pitchFamily="18" charset="0"/>
+              <a:cs typeface="Times New Roman" panose="02020603050405020304" pitchFamily="18" charset="0"/>
+            </a:endParaRPr>
+          </a:p>
+          <a:p>
+            <a:endParaRPr lang="en-US" sz="800" dirty="0" smtClean="0">
+              <a:latin typeface="Times New Roman" panose="02020603050405020304" pitchFamily="18" charset="0"/>
+              <a:cs typeface="Times New Roman" panose="02020603050405020304" pitchFamily="18" charset="0"/>
+            </a:endParaRPr>
+          </a:p>
+          <a:p>
+            <a:endParaRPr lang="en-US" sz="800" dirty="0">
+              <a:latin typeface="Times New Roman" panose="02020603050405020304" pitchFamily="18" charset="0"/>
+              <a:cs typeface="Times New Roman" panose="02020603050405020304" pitchFamily="18" charset="0"/>
+            </a:endParaRPr>
+          </a:p>
+          <a:p>
+            <a:endParaRPr lang="en-US" sz="800" dirty="0" smtClean="0">
+              <a:latin typeface="Times New Roman" panose="02020603050405020304" pitchFamily="18" charset="0"/>
+              <a:cs typeface="Times New Roman" panose="02020603050405020304" pitchFamily="18" charset="0"/>
+            </a:endParaRPr>
+          </a:p>
+          <a:p>
+            <a:r>
+              <a:rPr lang="en-US" sz="1200" dirty="0" smtClean="0">
+                <a:latin typeface="Times New Roman" panose="02020603050405020304" pitchFamily="18" charset="0"/>
+                <a:cs typeface="Times New Roman" panose="02020603050405020304" pitchFamily="18" charset="0"/>
+              </a:rPr>
+              <a:t>*note </a:t>
+            </a:r>
+            <a:r>
+              <a:rPr lang="en-US" sz="1200" dirty="0" err="1" smtClean="0">
+                <a:latin typeface="Times New Roman" panose="02020603050405020304" pitchFamily="18" charset="0"/>
+                <a:cs typeface="Times New Roman" panose="02020603050405020304" pitchFamily="18" charset="0"/>
+              </a:rPr>
+              <a:t>popen</a:t>
+            </a:r>
+            <a:r>
+              <a:rPr lang="en-US" sz="1200" dirty="0" smtClean="0">
+                <a:latin typeface="Times New Roman" panose="02020603050405020304" pitchFamily="18" charset="0"/>
+                <a:cs typeface="Times New Roman" panose="02020603050405020304" pitchFamily="18" charset="0"/>
+              </a:rPr>
+              <a:t> is depreciated</a:t>
+            </a:r>
+            <a:endParaRPr lang="en-US" sz="1200" dirty="0">
+              <a:latin typeface="Times New Roman" panose="02020603050405020304" pitchFamily="18" charset="0"/>
+              <a:cs typeface="Times New Roman" panose="02020603050405020304" pitchFamily="18" charset="0"/>
+            </a:endParaRPr>
           </a:p>
         </p:txBody>
       </p:sp>
@@ -5150,7 +5447,7 @@
 </p:sld>
 </file>
 
-<file path=ppt/slides/slide17.xml><?xml version="1.0" encoding="utf-8"?>
+<file path=ppt/slides/slide18.xml><?xml version="1.0" encoding="utf-8"?>
 <p:sld xmlns:a="http://schemas.openxmlformats.org/drawingml/2006/main" xmlns:r="http://schemas.openxmlformats.org/officeDocument/2006/relationships" xmlns:p="http://schemas.openxmlformats.org/presentationml/2006/main">
   <p:cSld>
     <p:spTree>

</xml_diff>